<commit_message>
Opracowanie wynikow testow oraz prezentacja koncowa
</commit_message>
<xml_diff>
--- a/DokumentacjeKoncowa/prezentacja.pptx
+++ b/DokumentacjeKoncowa/prezentacja.pptx
@@ -13,8 +13,10 @@
     <p:sldId id="261" r:id="rId7"/>
     <p:sldId id="262" r:id="rId8"/>
     <p:sldId id="263" r:id="rId9"/>
-    <p:sldId id="264" r:id="rId10"/>
-    <p:sldId id="265" r:id="rId11"/>
+    <p:sldId id="266" r:id="rId10"/>
+    <p:sldId id="267" r:id="rId11"/>
+    <p:sldId id="264" r:id="rId12"/>
+    <p:sldId id="265" r:id="rId13"/>
   </p:sldIdLst>
   <p:sldSz cx="9144000" cy="6858000" type="screen4x3"/>
   <p:notesSz cx="6858000" cy="9144000"/>
@@ -116,6 +118,1214 @@
 </p:presentation>
 </file>
 
+<file path=ppt/charts/chart1.xml><?xml version="1.0" encoding="utf-8"?>
+<c:chartSpace xmlns:c="http://schemas.openxmlformats.org/drawingml/2006/chart" xmlns:a="http://schemas.openxmlformats.org/drawingml/2006/main" xmlns:r="http://schemas.openxmlformats.org/officeDocument/2006/relationships">
+  <c:lang val="pl-PL"/>
+  <c:chart>
+    <c:title>
+      <c:tx>
+        <c:rich>
+          <a:bodyPr/>
+          <a:lstStyle/>
+          <a:p>
+            <a:pPr>
+              <a:defRPr/>
+            </a:pPr>
+            <a:r>
+              <a:rPr lang="pl-PL"/>
+              <a:t>Zestawienie naszego rozwiązania</a:t>
+            </a:r>
+            <a:r>
+              <a:rPr lang="pl-PL" baseline="0"/>
+              <a:t> z MongoDB</a:t>
+            </a:r>
+            <a:endParaRPr lang="pl-PL"/>
+          </a:p>
+        </c:rich>
+      </c:tx>
+      <c:layout/>
+    </c:title>
+    <c:plotArea>
+      <c:layout/>
+      <c:scatterChart>
+        <c:scatterStyle val="lineMarker"/>
+        <c:ser>
+          <c:idx val="0"/>
+          <c:order val="0"/>
+          <c:tx>
+            <c:v>Dane x 1</c:v>
+          </c:tx>
+          <c:spPr>
+            <a:ln w="12700">
+              <a:prstDash val="dash"/>
+            </a:ln>
+          </c:spPr>
+          <c:xVal>
+            <c:numRef>
+              <c:f>Arkusz1!$I$2:$L$2</c:f>
+              <c:numCache>
+                <c:formatCode>General</c:formatCode>
+                <c:ptCount val="4"/>
+                <c:pt idx="0">
+                  <c:v>100</c:v>
+                </c:pt>
+                <c:pt idx="1">
+                  <c:v>1000</c:v>
+                </c:pt>
+                <c:pt idx="2">
+                  <c:v>10000</c:v>
+                </c:pt>
+                <c:pt idx="3">
+                  <c:v>20000</c:v>
+                </c:pt>
+              </c:numCache>
+            </c:numRef>
+          </c:xVal>
+          <c:yVal>
+            <c:numRef>
+              <c:f>Arkusz1!$I$3:$I$6</c:f>
+              <c:numCache>
+                <c:formatCode>General</c:formatCode>
+                <c:ptCount val="4"/>
+                <c:pt idx="0">
+                  <c:v>148</c:v>
+                </c:pt>
+                <c:pt idx="1">
+                  <c:v>1520</c:v>
+                </c:pt>
+                <c:pt idx="2">
+                  <c:v>15467</c:v>
+                </c:pt>
+                <c:pt idx="3">
+                  <c:v>29095</c:v>
+                </c:pt>
+              </c:numCache>
+            </c:numRef>
+          </c:yVal>
+        </c:ser>
+        <c:ser>
+          <c:idx val="1"/>
+          <c:order val="1"/>
+          <c:tx>
+            <c:v>Dane x 5</c:v>
+          </c:tx>
+          <c:spPr>
+            <a:ln w="12700">
+              <a:prstDash val="dash"/>
+            </a:ln>
+          </c:spPr>
+          <c:xVal>
+            <c:numRef>
+              <c:f>Arkusz1!$I$2:$L$2</c:f>
+              <c:numCache>
+                <c:formatCode>General</c:formatCode>
+                <c:ptCount val="4"/>
+                <c:pt idx="0">
+                  <c:v>100</c:v>
+                </c:pt>
+                <c:pt idx="1">
+                  <c:v>1000</c:v>
+                </c:pt>
+                <c:pt idx="2">
+                  <c:v>10000</c:v>
+                </c:pt>
+                <c:pt idx="3">
+                  <c:v>20000</c:v>
+                </c:pt>
+              </c:numCache>
+            </c:numRef>
+          </c:xVal>
+          <c:yVal>
+            <c:numRef>
+              <c:f>Arkusz1!$J$3:$J$6</c:f>
+              <c:numCache>
+                <c:formatCode>General</c:formatCode>
+                <c:ptCount val="4"/>
+                <c:pt idx="0">
+                  <c:v>147</c:v>
+                </c:pt>
+                <c:pt idx="1">
+                  <c:v>1358</c:v>
+                </c:pt>
+                <c:pt idx="2">
+                  <c:v>14877</c:v>
+                </c:pt>
+                <c:pt idx="3">
+                  <c:v>29103</c:v>
+                </c:pt>
+              </c:numCache>
+            </c:numRef>
+          </c:yVal>
+        </c:ser>
+        <c:ser>
+          <c:idx val="2"/>
+          <c:order val="2"/>
+          <c:tx>
+            <c:v>Dane x 10</c:v>
+          </c:tx>
+          <c:spPr>
+            <a:ln w="12700"/>
+          </c:spPr>
+          <c:dPt>
+            <c:idx val="3"/>
+            <c:spPr>
+              <a:ln w="12700">
+                <a:prstDash val="dash"/>
+              </a:ln>
+            </c:spPr>
+          </c:dPt>
+          <c:xVal>
+            <c:numRef>
+              <c:f>Arkusz1!$I$2:$L$2</c:f>
+              <c:numCache>
+                <c:formatCode>General</c:formatCode>
+                <c:ptCount val="4"/>
+                <c:pt idx="0">
+                  <c:v>100</c:v>
+                </c:pt>
+                <c:pt idx="1">
+                  <c:v>1000</c:v>
+                </c:pt>
+                <c:pt idx="2">
+                  <c:v>10000</c:v>
+                </c:pt>
+                <c:pt idx="3">
+                  <c:v>20000</c:v>
+                </c:pt>
+              </c:numCache>
+            </c:numRef>
+          </c:xVal>
+          <c:yVal>
+            <c:numRef>
+              <c:f>Arkusz1!$K$3:$K$6</c:f>
+              <c:numCache>
+                <c:formatCode>General</c:formatCode>
+                <c:ptCount val="4"/>
+                <c:pt idx="0">
+                  <c:v>170</c:v>
+                </c:pt>
+                <c:pt idx="1">
+                  <c:v>1618</c:v>
+                </c:pt>
+                <c:pt idx="2">
+                  <c:v>15416</c:v>
+                </c:pt>
+                <c:pt idx="3">
+                  <c:v>30739</c:v>
+                </c:pt>
+              </c:numCache>
+            </c:numRef>
+          </c:yVal>
+        </c:ser>
+        <c:ser>
+          <c:idx val="3"/>
+          <c:order val="3"/>
+          <c:tx>
+            <c:v>Dane x 20</c:v>
+          </c:tx>
+          <c:spPr>
+            <a:ln w="12700">
+              <a:prstDash val="dash"/>
+            </a:ln>
+          </c:spPr>
+          <c:xVal>
+            <c:numRef>
+              <c:f>Arkusz1!$I$2:$L$2</c:f>
+              <c:numCache>
+                <c:formatCode>General</c:formatCode>
+                <c:ptCount val="4"/>
+                <c:pt idx="0">
+                  <c:v>100</c:v>
+                </c:pt>
+                <c:pt idx="1">
+                  <c:v>1000</c:v>
+                </c:pt>
+                <c:pt idx="2">
+                  <c:v>10000</c:v>
+                </c:pt>
+                <c:pt idx="3">
+                  <c:v>20000</c:v>
+                </c:pt>
+              </c:numCache>
+            </c:numRef>
+          </c:xVal>
+          <c:yVal>
+            <c:numRef>
+              <c:f>Arkusz1!$L$3:$L$6</c:f>
+              <c:numCache>
+                <c:formatCode>General</c:formatCode>
+                <c:ptCount val="4"/>
+                <c:pt idx="0">
+                  <c:v>154</c:v>
+                </c:pt>
+                <c:pt idx="1">
+                  <c:v>1759</c:v>
+                </c:pt>
+                <c:pt idx="2">
+                  <c:v>19346</c:v>
+                </c:pt>
+                <c:pt idx="3">
+                  <c:v>32464</c:v>
+                </c:pt>
+              </c:numCache>
+            </c:numRef>
+          </c:yVal>
+        </c:ser>
+        <c:ser>
+          <c:idx val="4"/>
+          <c:order val="4"/>
+          <c:tx>
+            <c:v>Dane x 1 mongo</c:v>
+          </c:tx>
+          <c:spPr>
+            <a:ln w="12700"/>
+          </c:spPr>
+          <c:xVal>
+            <c:numRef>
+              <c:f>Arkusz1!$C$2:$F$2</c:f>
+              <c:numCache>
+                <c:formatCode>General</c:formatCode>
+                <c:ptCount val="4"/>
+                <c:pt idx="0">
+                  <c:v>100</c:v>
+                </c:pt>
+                <c:pt idx="1">
+                  <c:v>1000</c:v>
+                </c:pt>
+                <c:pt idx="2">
+                  <c:v>10000</c:v>
+                </c:pt>
+                <c:pt idx="3">
+                  <c:v>20000</c:v>
+                </c:pt>
+              </c:numCache>
+            </c:numRef>
+          </c:xVal>
+          <c:yVal>
+            <c:numRef>
+              <c:f>Arkusz1!$C$3:$C$6</c:f>
+              <c:numCache>
+                <c:formatCode>General</c:formatCode>
+                <c:ptCount val="4"/>
+                <c:pt idx="0">
+                  <c:v>143</c:v>
+                </c:pt>
+                <c:pt idx="1">
+                  <c:v>486</c:v>
+                </c:pt>
+                <c:pt idx="2">
+                  <c:v>3244</c:v>
+                </c:pt>
+                <c:pt idx="3">
+                  <c:v>5259</c:v>
+                </c:pt>
+              </c:numCache>
+            </c:numRef>
+          </c:yVal>
+        </c:ser>
+        <c:ser>
+          <c:idx val="5"/>
+          <c:order val="5"/>
+          <c:tx>
+            <c:v>Dane x 5 mongo</c:v>
+          </c:tx>
+          <c:spPr>
+            <a:ln w="12700"/>
+          </c:spPr>
+          <c:xVal>
+            <c:numRef>
+              <c:f>Arkusz1!$C$2:$F$2</c:f>
+              <c:numCache>
+                <c:formatCode>General</c:formatCode>
+                <c:ptCount val="4"/>
+                <c:pt idx="0">
+                  <c:v>100</c:v>
+                </c:pt>
+                <c:pt idx="1">
+                  <c:v>1000</c:v>
+                </c:pt>
+                <c:pt idx="2">
+                  <c:v>10000</c:v>
+                </c:pt>
+                <c:pt idx="3">
+                  <c:v>20000</c:v>
+                </c:pt>
+              </c:numCache>
+            </c:numRef>
+          </c:xVal>
+          <c:yVal>
+            <c:numRef>
+              <c:f>Arkusz1!$D$3:$D$6</c:f>
+              <c:numCache>
+                <c:formatCode>General</c:formatCode>
+                <c:ptCount val="4"/>
+                <c:pt idx="0">
+                  <c:v>26</c:v>
+                </c:pt>
+                <c:pt idx="1">
+                  <c:v>302</c:v>
+                </c:pt>
+                <c:pt idx="2">
+                  <c:v>2906</c:v>
+                </c:pt>
+                <c:pt idx="3">
+                  <c:v>5487</c:v>
+                </c:pt>
+              </c:numCache>
+            </c:numRef>
+          </c:yVal>
+        </c:ser>
+        <c:ser>
+          <c:idx val="6"/>
+          <c:order val="6"/>
+          <c:tx>
+            <c:v>Dane x 10 mongo</c:v>
+          </c:tx>
+          <c:spPr>
+            <a:ln w="12700"/>
+          </c:spPr>
+          <c:xVal>
+            <c:numRef>
+              <c:f>Arkusz1!$C$2:$F$2</c:f>
+              <c:numCache>
+                <c:formatCode>General</c:formatCode>
+                <c:ptCount val="4"/>
+                <c:pt idx="0">
+                  <c:v>100</c:v>
+                </c:pt>
+                <c:pt idx="1">
+                  <c:v>1000</c:v>
+                </c:pt>
+                <c:pt idx="2">
+                  <c:v>10000</c:v>
+                </c:pt>
+                <c:pt idx="3">
+                  <c:v>20000</c:v>
+                </c:pt>
+              </c:numCache>
+            </c:numRef>
+          </c:xVal>
+          <c:yVal>
+            <c:numRef>
+              <c:f>Arkusz1!$E$3:$E$6</c:f>
+              <c:numCache>
+                <c:formatCode>General</c:formatCode>
+                <c:ptCount val="4"/>
+                <c:pt idx="0">
+                  <c:v>25</c:v>
+                </c:pt>
+                <c:pt idx="1">
+                  <c:v>346</c:v>
+                </c:pt>
+                <c:pt idx="2">
+                  <c:v>2390</c:v>
+                </c:pt>
+                <c:pt idx="3">
+                  <c:v>5994</c:v>
+                </c:pt>
+              </c:numCache>
+            </c:numRef>
+          </c:yVal>
+        </c:ser>
+        <c:ser>
+          <c:idx val="7"/>
+          <c:order val="7"/>
+          <c:tx>
+            <c:v>Dane x 20 mongo</c:v>
+          </c:tx>
+          <c:spPr>
+            <a:ln w="12700"/>
+          </c:spPr>
+          <c:xVal>
+            <c:numRef>
+              <c:f>Arkusz1!$C$2:$F$2</c:f>
+              <c:numCache>
+                <c:formatCode>General</c:formatCode>
+                <c:ptCount val="4"/>
+                <c:pt idx="0">
+                  <c:v>100</c:v>
+                </c:pt>
+                <c:pt idx="1">
+                  <c:v>1000</c:v>
+                </c:pt>
+                <c:pt idx="2">
+                  <c:v>10000</c:v>
+                </c:pt>
+                <c:pt idx="3">
+                  <c:v>20000</c:v>
+                </c:pt>
+              </c:numCache>
+            </c:numRef>
+          </c:xVal>
+          <c:yVal>
+            <c:numRef>
+              <c:f>Arkusz1!$F$3:$F$6</c:f>
+              <c:numCache>
+                <c:formatCode>General</c:formatCode>
+                <c:ptCount val="4"/>
+                <c:pt idx="0">
+                  <c:v>26</c:v>
+                </c:pt>
+                <c:pt idx="1">
+                  <c:v>257</c:v>
+                </c:pt>
+                <c:pt idx="2">
+                  <c:v>2860</c:v>
+                </c:pt>
+                <c:pt idx="3">
+                  <c:v>6928</c:v>
+                </c:pt>
+              </c:numCache>
+            </c:numRef>
+          </c:yVal>
+        </c:ser>
+        <c:axId val="85036032"/>
+        <c:axId val="85046400"/>
+      </c:scatterChart>
+      <c:valAx>
+        <c:axId val="85036032"/>
+        <c:scaling>
+          <c:orientation val="minMax"/>
+        </c:scaling>
+        <c:axPos val="b"/>
+        <c:majorGridlines/>
+        <c:title>
+          <c:tx>
+            <c:rich>
+              <a:bodyPr/>
+              <a:lstStyle/>
+              <a:p>
+                <a:pPr>
+                  <a:defRPr/>
+                </a:pPr>
+                <a:r>
+                  <a:rPr lang="pl-PL"/>
+                  <a:t>Ilość</a:t>
+                </a:r>
+                <a:r>
+                  <a:rPr lang="pl-PL" baseline="0"/>
+                  <a:t> insertów</a:t>
+                </a:r>
+                <a:endParaRPr lang="pl-PL"/>
+              </a:p>
+            </c:rich>
+          </c:tx>
+          <c:layout/>
+        </c:title>
+        <c:numFmt formatCode="General" sourceLinked="1"/>
+        <c:majorTickMark val="none"/>
+        <c:tickLblPos val="nextTo"/>
+        <c:crossAx val="85046400"/>
+        <c:crosses val="autoZero"/>
+        <c:crossBetween val="midCat"/>
+      </c:valAx>
+      <c:valAx>
+        <c:axId val="85046400"/>
+        <c:scaling>
+          <c:orientation val="minMax"/>
+        </c:scaling>
+        <c:axPos val="l"/>
+        <c:majorGridlines/>
+        <c:minorGridlines/>
+        <c:title>
+          <c:tx>
+            <c:rich>
+              <a:bodyPr/>
+              <a:lstStyle/>
+              <a:p>
+                <a:pPr>
+                  <a:defRPr/>
+                </a:pPr>
+                <a:r>
+                  <a:rPr lang="pl-PL"/>
+                  <a:t>Czas w milisekundach</a:t>
+                </a:r>
+              </a:p>
+            </c:rich>
+          </c:tx>
+          <c:layout/>
+        </c:title>
+        <c:numFmt formatCode="General" sourceLinked="1"/>
+        <c:majorTickMark val="none"/>
+        <c:tickLblPos val="nextTo"/>
+        <c:crossAx val="85036032"/>
+        <c:crosses val="autoZero"/>
+        <c:crossBetween val="midCat"/>
+      </c:valAx>
+      <c:spPr>
+        <a:noFill/>
+        <a:ln w="31750">
+          <a:gradFill>
+            <a:gsLst>
+              <a:gs pos="0">
+                <a:srgbClr val="4F81BD">
+                  <a:tint val="66000"/>
+                  <a:satMod val="160000"/>
+                </a:srgbClr>
+              </a:gs>
+              <a:gs pos="50000">
+                <a:srgbClr val="4F81BD">
+                  <a:tint val="44500"/>
+                  <a:satMod val="160000"/>
+                </a:srgbClr>
+              </a:gs>
+              <a:gs pos="100000">
+                <a:srgbClr val="4F81BD">
+                  <a:tint val="23500"/>
+                  <a:satMod val="160000"/>
+                </a:srgbClr>
+              </a:gs>
+            </a:gsLst>
+            <a:lin ang="5400000" scaled="0"/>
+          </a:gradFill>
+          <a:prstDash val="solid"/>
+        </a:ln>
+      </c:spPr>
+    </c:plotArea>
+    <c:legend>
+      <c:legendPos val="r"/>
+      <c:layout/>
+    </c:legend>
+    <c:plotVisOnly val="1"/>
+  </c:chart>
+  <c:externalData r:id="rId1"/>
+</c:chartSpace>
+</file>
+
+<file path=ppt/charts/chart2.xml><?xml version="1.0" encoding="utf-8"?>
+<c:chartSpace xmlns:c="http://schemas.openxmlformats.org/drawingml/2006/chart" xmlns:a="http://schemas.openxmlformats.org/drawingml/2006/main" xmlns:r="http://schemas.openxmlformats.org/officeDocument/2006/relationships">
+  <c:lang val="pl-PL"/>
+  <c:chart>
+    <c:title>
+      <c:tx>
+        <c:rich>
+          <a:bodyPr/>
+          <a:lstStyle/>
+          <a:p>
+            <a:pPr>
+              <a:defRPr/>
+            </a:pPr>
+            <a:r>
+              <a:rPr lang="pl-PL"/>
+              <a:t>Test MongoDB</a:t>
+            </a:r>
+          </a:p>
+        </c:rich>
+      </c:tx>
+      <c:layout/>
+    </c:title>
+    <c:plotArea>
+      <c:layout>
+        <c:manualLayout>
+          <c:layoutTarget val="inner"/>
+          <c:xMode val="edge"/>
+          <c:yMode val="edge"/>
+          <c:x val="9.3507148236927601E-2"/>
+          <c:y val="0.16404433054289355"/>
+          <c:w val="0.74463438343842525"/>
+          <c:h val="0.76525601057874093"/>
+        </c:manualLayout>
+      </c:layout>
+      <c:scatterChart>
+        <c:scatterStyle val="lineMarker"/>
+        <c:ser>
+          <c:idx val="0"/>
+          <c:order val="0"/>
+          <c:tx>
+            <c:v>Dane x 1</c:v>
+          </c:tx>
+          <c:xVal>
+            <c:numRef>
+              <c:f>Arkusz1!$C$2:$F$2</c:f>
+              <c:numCache>
+                <c:formatCode>General</c:formatCode>
+                <c:ptCount val="4"/>
+                <c:pt idx="0">
+                  <c:v>100</c:v>
+                </c:pt>
+                <c:pt idx="1">
+                  <c:v>1000</c:v>
+                </c:pt>
+                <c:pt idx="2">
+                  <c:v>10000</c:v>
+                </c:pt>
+                <c:pt idx="3">
+                  <c:v>20000</c:v>
+                </c:pt>
+              </c:numCache>
+            </c:numRef>
+          </c:xVal>
+          <c:yVal>
+            <c:numRef>
+              <c:f>Arkusz1!$C$3:$C$6</c:f>
+              <c:numCache>
+                <c:formatCode>General</c:formatCode>
+                <c:ptCount val="4"/>
+                <c:pt idx="0">
+                  <c:v>143</c:v>
+                </c:pt>
+                <c:pt idx="1">
+                  <c:v>486</c:v>
+                </c:pt>
+                <c:pt idx="2">
+                  <c:v>3244</c:v>
+                </c:pt>
+                <c:pt idx="3">
+                  <c:v>5259</c:v>
+                </c:pt>
+              </c:numCache>
+            </c:numRef>
+          </c:yVal>
+        </c:ser>
+        <c:ser>
+          <c:idx val="1"/>
+          <c:order val="1"/>
+          <c:tx>
+            <c:v>Dane x 5</c:v>
+          </c:tx>
+          <c:xVal>
+            <c:numRef>
+              <c:f>Arkusz1!$C$2:$F$2</c:f>
+              <c:numCache>
+                <c:formatCode>General</c:formatCode>
+                <c:ptCount val="4"/>
+                <c:pt idx="0">
+                  <c:v>100</c:v>
+                </c:pt>
+                <c:pt idx="1">
+                  <c:v>1000</c:v>
+                </c:pt>
+                <c:pt idx="2">
+                  <c:v>10000</c:v>
+                </c:pt>
+                <c:pt idx="3">
+                  <c:v>20000</c:v>
+                </c:pt>
+              </c:numCache>
+            </c:numRef>
+          </c:xVal>
+          <c:yVal>
+            <c:numRef>
+              <c:f>Arkusz1!$D$3:$D$6</c:f>
+              <c:numCache>
+                <c:formatCode>General</c:formatCode>
+                <c:ptCount val="4"/>
+                <c:pt idx="0">
+                  <c:v>26</c:v>
+                </c:pt>
+                <c:pt idx="1">
+                  <c:v>302</c:v>
+                </c:pt>
+                <c:pt idx="2">
+                  <c:v>2906</c:v>
+                </c:pt>
+                <c:pt idx="3">
+                  <c:v>5487</c:v>
+                </c:pt>
+              </c:numCache>
+            </c:numRef>
+          </c:yVal>
+        </c:ser>
+        <c:ser>
+          <c:idx val="2"/>
+          <c:order val="2"/>
+          <c:tx>
+            <c:v>Dane x 10</c:v>
+          </c:tx>
+          <c:xVal>
+            <c:numRef>
+              <c:f>Arkusz1!$C$2:$F$2</c:f>
+              <c:numCache>
+                <c:formatCode>General</c:formatCode>
+                <c:ptCount val="4"/>
+                <c:pt idx="0">
+                  <c:v>100</c:v>
+                </c:pt>
+                <c:pt idx="1">
+                  <c:v>1000</c:v>
+                </c:pt>
+                <c:pt idx="2">
+                  <c:v>10000</c:v>
+                </c:pt>
+                <c:pt idx="3">
+                  <c:v>20000</c:v>
+                </c:pt>
+              </c:numCache>
+            </c:numRef>
+          </c:xVal>
+          <c:yVal>
+            <c:numRef>
+              <c:f>Arkusz1!$E$3:$E$6</c:f>
+              <c:numCache>
+                <c:formatCode>General</c:formatCode>
+                <c:ptCount val="4"/>
+                <c:pt idx="0">
+                  <c:v>25</c:v>
+                </c:pt>
+                <c:pt idx="1">
+                  <c:v>346</c:v>
+                </c:pt>
+                <c:pt idx="2">
+                  <c:v>2390</c:v>
+                </c:pt>
+                <c:pt idx="3">
+                  <c:v>5994</c:v>
+                </c:pt>
+              </c:numCache>
+            </c:numRef>
+          </c:yVal>
+        </c:ser>
+        <c:ser>
+          <c:idx val="3"/>
+          <c:order val="3"/>
+          <c:tx>
+            <c:v>Dane x 20</c:v>
+          </c:tx>
+          <c:xVal>
+            <c:numRef>
+              <c:f>Arkusz1!$C$2:$F$2</c:f>
+              <c:numCache>
+                <c:formatCode>General</c:formatCode>
+                <c:ptCount val="4"/>
+                <c:pt idx="0">
+                  <c:v>100</c:v>
+                </c:pt>
+                <c:pt idx="1">
+                  <c:v>1000</c:v>
+                </c:pt>
+                <c:pt idx="2">
+                  <c:v>10000</c:v>
+                </c:pt>
+                <c:pt idx="3">
+                  <c:v>20000</c:v>
+                </c:pt>
+              </c:numCache>
+            </c:numRef>
+          </c:xVal>
+          <c:yVal>
+            <c:numRef>
+              <c:f>Arkusz1!$F$3:$F$6</c:f>
+              <c:numCache>
+                <c:formatCode>General</c:formatCode>
+                <c:ptCount val="4"/>
+                <c:pt idx="0">
+                  <c:v>26</c:v>
+                </c:pt>
+                <c:pt idx="1">
+                  <c:v>257</c:v>
+                </c:pt>
+                <c:pt idx="2">
+                  <c:v>2860</c:v>
+                </c:pt>
+                <c:pt idx="3">
+                  <c:v>6928</c:v>
+                </c:pt>
+              </c:numCache>
+            </c:numRef>
+          </c:yVal>
+        </c:ser>
+        <c:axId val="82152832"/>
+        <c:axId val="82179584"/>
+      </c:scatterChart>
+      <c:valAx>
+        <c:axId val="82152832"/>
+        <c:scaling>
+          <c:orientation val="minMax"/>
+          <c:max val="25000"/>
+        </c:scaling>
+        <c:axPos val="b"/>
+        <c:majorGridlines/>
+        <c:title>
+          <c:tx>
+            <c:rich>
+              <a:bodyPr/>
+              <a:lstStyle/>
+              <a:p>
+                <a:pPr>
+                  <a:defRPr/>
+                </a:pPr>
+                <a:r>
+                  <a:rPr lang="pl-PL"/>
+                  <a:t>Ilość insertów</a:t>
+                </a:r>
+              </a:p>
+            </c:rich>
+          </c:tx>
+          <c:layout/>
+        </c:title>
+        <c:numFmt formatCode="General" sourceLinked="1"/>
+        <c:majorTickMark val="none"/>
+        <c:tickLblPos val="nextTo"/>
+        <c:crossAx val="82179584"/>
+        <c:crosses val="autoZero"/>
+        <c:crossBetween val="midCat"/>
+      </c:valAx>
+      <c:valAx>
+        <c:axId val="82179584"/>
+        <c:scaling>
+          <c:orientation val="minMax"/>
+          <c:max val="7000"/>
+        </c:scaling>
+        <c:axPos val="l"/>
+        <c:majorGridlines/>
+        <c:minorGridlines/>
+        <c:title>
+          <c:tx>
+            <c:rich>
+              <a:bodyPr/>
+              <a:lstStyle/>
+              <a:p>
+                <a:pPr>
+                  <a:defRPr/>
+                </a:pPr>
+                <a:r>
+                  <a:rPr lang="pl-PL"/>
+                  <a:t>Czas w milisekundach</a:t>
+                </a:r>
+              </a:p>
+            </c:rich>
+          </c:tx>
+          <c:layout/>
+        </c:title>
+        <c:numFmt formatCode="General" sourceLinked="1"/>
+        <c:majorTickMark val="none"/>
+        <c:tickLblPos val="nextTo"/>
+        <c:spPr>
+          <a:ln w="3175"/>
+        </c:spPr>
+        <c:crossAx val="82152832"/>
+        <c:crosses val="autoZero"/>
+        <c:crossBetween val="midCat"/>
+      </c:valAx>
+    </c:plotArea>
+    <c:legend>
+      <c:legendPos val="r"/>
+      <c:layout>
+        <c:manualLayout>
+          <c:xMode val="edge"/>
+          <c:yMode val="edge"/>
+          <c:x val="0.88310276219774952"/>
+          <c:y val="0.37867832926747019"/>
+          <c:w val="9.7055873569374715E-2"/>
+          <c:h val="0.33896946118773208"/>
+        </c:manualLayout>
+      </c:layout>
+    </c:legend>
+    <c:plotVisOnly val="1"/>
+  </c:chart>
+  <c:spPr>
+    <a:ln w="3175"/>
+  </c:spPr>
+  <c:externalData r:id="rId1"/>
+</c:chartSpace>
+</file>
+
+<file path=ppt/charts/chart3.xml><?xml version="1.0" encoding="utf-8"?>
+<c:chartSpace xmlns:c="http://schemas.openxmlformats.org/drawingml/2006/chart" xmlns:a="http://schemas.openxmlformats.org/drawingml/2006/main" xmlns:r="http://schemas.openxmlformats.org/officeDocument/2006/relationships">
+  <c:lang val="pl-PL"/>
+  <c:chart>
+    <c:title>
+      <c:tx>
+        <c:rich>
+          <a:bodyPr/>
+          <a:lstStyle/>
+          <a:p>
+            <a:pPr>
+              <a:defRPr/>
+            </a:pPr>
+            <a:r>
+              <a:rPr lang="pl-PL"/>
+              <a:t>Test nasze</a:t>
+            </a:r>
+            <a:r>
+              <a:rPr lang="pl-PL" baseline="0"/>
+              <a:t> rozwiązanie</a:t>
+            </a:r>
+            <a:endParaRPr lang="pl-PL"/>
+          </a:p>
+        </c:rich>
+      </c:tx>
+      <c:layout/>
+    </c:title>
+    <c:plotArea>
+      <c:layout/>
+      <c:scatterChart>
+        <c:scatterStyle val="lineMarker"/>
+        <c:ser>
+          <c:idx val="0"/>
+          <c:order val="0"/>
+          <c:tx>
+            <c:v>Dane x 1</c:v>
+          </c:tx>
+          <c:xVal>
+            <c:numRef>
+              <c:f>Arkusz1!$I$2:$L$2</c:f>
+              <c:numCache>
+                <c:formatCode>General</c:formatCode>
+                <c:ptCount val="4"/>
+                <c:pt idx="0">
+                  <c:v>100</c:v>
+                </c:pt>
+                <c:pt idx="1">
+                  <c:v>1000</c:v>
+                </c:pt>
+                <c:pt idx="2">
+                  <c:v>10000</c:v>
+                </c:pt>
+                <c:pt idx="3">
+                  <c:v>20000</c:v>
+                </c:pt>
+              </c:numCache>
+            </c:numRef>
+          </c:xVal>
+          <c:yVal>
+            <c:numRef>
+              <c:f>Arkusz1!$I$3:$I$6</c:f>
+              <c:numCache>
+                <c:formatCode>General</c:formatCode>
+                <c:ptCount val="4"/>
+                <c:pt idx="0">
+                  <c:v>148</c:v>
+                </c:pt>
+                <c:pt idx="1">
+                  <c:v>1520</c:v>
+                </c:pt>
+                <c:pt idx="2">
+                  <c:v>15467</c:v>
+                </c:pt>
+                <c:pt idx="3">
+                  <c:v>29095</c:v>
+                </c:pt>
+              </c:numCache>
+            </c:numRef>
+          </c:yVal>
+        </c:ser>
+        <c:ser>
+          <c:idx val="1"/>
+          <c:order val="1"/>
+          <c:tx>
+            <c:v>Dane x 5</c:v>
+          </c:tx>
+          <c:xVal>
+            <c:numRef>
+              <c:f>Arkusz1!$I$2:$L$2</c:f>
+              <c:numCache>
+                <c:formatCode>General</c:formatCode>
+                <c:ptCount val="4"/>
+                <c:pt idx="0">
+                  <c:v>100</c:v>
+                </c:pt>
+                <c:pt idx="1">
+                  <c:v>1000</c:v>
+                </c:pt>
+                <c:pt idx="2">
+                  <c:v>10000</c:v>
+                </c:pt>
+                <c:pt idx="3">
+                  <c:v>20000</c:v>
+                </c:pt>
+              </c:numCache>
+            </c:numRef>
+          </c:xVal>
+          <c:yVal>
+            <c:numRef>
+              <c:f>Arkusz1!$J$3:$J$6</c:f>
+              <c:numCache>
+                <c:formatCode>General</c:formatCode>
+                <c:ptCount val="4"/>
+                <c:pt idx="0">
+                  <c:v>147</c:v>
+                </c:pt>
+                <c:pt idx="1">
+                  <c:v>1358</c:v>
+                </c:pt>
+                <c:pt idx="2">
+                  <c:v>14877</c:v>
+                </c:pt>
+                <c:pt idx="3">
+                  <c:v>29103</c:v>
+                </c:pt>
+              </c:numCache>
+            </c:numRef>
+          </c:yVal>
+        </c:ser>
+        <c:ser>
+          <c:idx val="2"/>
+          <c:order val="2"/>
+          <c:tx>
+            <c:v>Dane x 10</c:v>
+          </c:tx>
+          <c:xVal>
+            <c:numRef>
+              <c:f>Arkusz1!$I$2:$L$2</c:f>
+              <c:numCache>
+                <c:formatCode>General</c:formatCode>
+                <c:ptCount val="4"/>
+                <c:pt idx="0">
+                  <c:v>100</c:v>
+                </c:pt>
+                <c:pt idx="1">
+                  <c:v>1000</c:v>
+                </c:pt>
+                <c:pt idx="2">
+                  <c:v>10000</c:v>
+                </c:pt>
+                <c:pt idx="3">
+                  <c:v>20000</c:v>
+                </c:pt>
+              </c:numCache>
+            </c:numRef>
+          </c:xVal>
+          <c:yVal>
+            <c:numRef>
+              <c:f>Arkusz1!$K$3:$K$6</c:f>
+              <c:numCache>
+                <c:formatCode>General</c:formatCode>
+                <c:ptCount val="4"/>
+                <c:pt idx="0">
+                  <c:v>170</c:v>
+                </c:pt>
+                <c:pt idx="1">
+                  <c:v>1618</c:v>
+                </c:pt>
+                <c:pt idx="2">
+                  <c:v>15416</c:v>
+                </c:pt>
+                <c:pt idx="3">
+                  <c:v>30739</c:v>
+                </c:pt>
+              </c:numCache>
+            </c:numRef>
+          </c:yVal>
+        </c:ser>
+        <c:ser>
+          <c:idx val="3"/>
+          <c:order val="3"/>
+          <c:tx>
+            <c:v>Dane x 20</c:v>
+          </c:tx>
+          <c:xVal>
+            <c:numRef>
+              <c:f>Arkusz1!$I$2:$L$2</c:f>
+              <c:numCache>
+                <c:formatCode>General</c:formatCode>
+                <c:ptCount val="4"/>
+                <c:pt idx="0">
+                  <c:v>100</c:v>
+                </c:pt>
+                <c:pt idx="1">
+                  <c:v>1000</c:v>
+                </c:pt>
+                <c:pt idx="2">
+                  <c:v>10000</c:v>
+                </c:pt>
+                <c:pt idx="3">
+                  <c:v>20000</c:v>
+                </c:pt>
+              </c:numCache>
+            </c:numRef>
+          </c:xVal>
+          <c:yVal>
+            <c:numRef>
+              <c:f>Arkusz1!$L$3:$L$6</c:f>
+              <c:numCache>
+                <c:formatCode>General</c:formatCode>
+                <c:ptCount val="4"/>
+                <c:pt idx="0">
+                  <c:v>154</c:v>
+                </c:pt>
+                <c:pt idx="1">
+                  <c:v>1759</c:v>
+                </c:pt>
+                <c:pt idx="2">
+                  <c:v>19346</c:v>
+                </c:pt>
+                <c:pt idx="3">
+                  <c:v>32464</c:v>
+                </c:pt>
+              </c:numCache>
+            </c:numRef>
+          </c:yVal>
+        </c:ser>
+        <c:axId val="99915648"/>
+        <c:axId val="99932800"/>
+      </c:scatterChart>
+      <c:valAx>
+        <c:axId val="99915648"/>
+        <c:scaling>
+          <c:orientation val="minMax"/>
+        </c:scaling>
+        <c:axPos val="b"/>
+        <c:majorGridlines/>
+        <c:title>
+          <c:tx>
+            <c:rich>
+              <a:bodyPr/>
+              <a:lstStyle/>
+              <a:p>
+                <a:pPr>
+                  <a:defRPr/>
+                </a:pPr>
+                <a:r>
+                  <a:rPr lang="pl-PL"/>
+                  <a:t>ilośc insertów</a:t>
+                </a:r>
+              </a:p>
+            </c:rich>
+          </c:tx>
+          <c:layout/>
+        </c:title>
+        <c:numFmt formatCode="General" sourceLinked="1"/>
+        <c:majorTickMark val="none"/>
+        <c:tickLblPos val="nextTo"/>
+        <c:crossAx val="99932800"/>
+        <c:crosses val="autoZero"/>
+        <c:crossBetween val="midCat"/>
+      </c:valAx>
+      <c:valAx>
+        <c:axId val="99932800"/>
+        <c:scaling>
+          <c:orientation val="minMax"/>
+        </c:scaling>
+        <c:axPos val="l"/>
+        <c:majorGridlines/>
+        <c:minorGridlines/>
+        <c:title>
+          <c:tx>
+            <c:rich>
+              <a:bodyPr/>
+              <a:lstStyle/>
+              <a:p>
+                <a:pPr>
+                  <a:defRPr/>
+                </a:pPr>
+                <a:r>
+                  <a:rPr lang="pl-PL"/>
+                  <a:t>Czas w milisekundach</a:t>
+                </a:r>
+              </a:p>
+            </c:rich>
+          </c:tx>
+          <c:layout/>
+        </c:title>
+        <c:numFmt formatCode="General" sourceLinked="1"/>
+        <c:majorTickMark val="none"/>
+        <c:tickLblPos val="nextTo"/>
+        <c:crossAx val="99915648"/>
+        <c:crosses val="autoZero"/>
+        <c:crossBetween val="midCat"/>
+      </c:valAx>
+    </c:plotArea>
+    <c:legend>
+      <c:legendPos val="r"/>
+      <c:layout/>
+    </c:legend>
+    <c:plotVisOnly val="1"/>
+  </c:chart>
+  <c:externalData r:id="rId1"/>
+</c:chartSpace>
+</file>
+
 <file path=ppt/slideLayouts/slideLayout1.xml><?xml version="1.0" encoding="utf-8"?>
 <p:sldLayout xmlns:a="http://schemas.openxmlformats.org/drawingml/2006/main" xmlns:r="http://schemas.openxmlformats.org/officeDocument/2006/relationships" xmlns:p="http://schemas.openxmlformats.org/presentationml/2006/main" showMasterSp="0" type="title" preserve="1">
   <p:cSld name="Slajd tytułowy">
@@ -260,7 +1470,7 @@
             <a:fld id="{66221E02-25CB-4963-84BC-0813985E7D90}" type="datetimeFigureOut">
               <a:rPr lang="pl-PL" smtClean="0"/>
               <a:pPr/>
-              <a:t>2013-06-10</a:t>
+              <a:t>2013-06-11</a:t>
             </a:fld>
             <a:endParaRPr lang="pl-PL"/>
           </a:p>
@@ -621,7 +1831,7 @@
             <a:fld id="{66221E02-25CB-4963-84BC-0813985E7D90}" type="datetimeFigureOut">
               <a:rPr lang="pl-PL" smtClean="0"/>
               <a:pPr/>
-              <a:t>2013-06-10</a:t>
+              <a:t>2013-06-11</a:t>
             </a:fld>
             <a:endParaRPr lang="pl-PL"/>
           </a:p>
@@ -798,7 +2008,7 @@
             <a:fld id="{66221E02-25CB-4963-84BC-0813985E7D90}" type="datetimeFigureOut">
               <a:rPr lang="pl-PL" smtClean="0"/>
               <a:pPr/>
-              <a:t>2013-06-10</a:t>
+              <a:t>2013-06-11</a:t>
             </a:fld>
             <a:endParaRPr lang="pl-PL"/>
           </a:p>
@@ -1035,7 +2245,7 @@
             <a:fld id="{66221E02-25CB-4963-84BC-0813985E7D90}" type="datetimeFigureOut">
               <a:rPr lang="pl-PL" smtClean="0"/>
               <a:pPr/>
-              <a:t>2013-06-10</a:t>
+              <a:t>2013-06-11</a:t>
             </a:fld>
             <a:endParaRPr lang="pl-PL"/>
           </a:p>
@@ -1306,7 +2516,7 @@
             <a:fld id="{66221E02-25CB-4963-84BC-0813985E7D90}" type="datetimeFigureOut">
               <a:rPr lang="pl-PL" smtClean="0"/>
               <a:pPr/>
-              <a:t>2013-06-10</a:t>
+              <a:t>2013-06-11</a:t>
             </a:fld>
             <a:endParaRPr lang="pl-PL"/>
           </a:p>
@@ -1528,7 +2738,7 @@
             <a:fld id="{66221E02-25CB-4963-84BC-0813985E7D90}" type="datetimeFigureOut">
               <a:rPr lang="pl-PL" smtClean="0"/>
               <a:pPr/>
-              <a:t>2013-06-10</a:t>
+              <a:t>2013-06-11</a:t>
             </a:fld>
             <a:endParaRPr lang="pl-PL"/>
           </a:p>
@@ -1882,7 +3092,7 @@
             <a:fld id="{66221E02-25CB-4963-84BC-0813985E7D90}" type="datetimeFigureOut">
               <a:rPr lang="pl-PL" smtClean="0"/>
               <a:pPr/>
-              <a:t>2013-06-10</a:t>
+              <a:t>2013-06-11</a:t>
             </a:fld>
             <a:endParaRPr lang="pl-PL"/>
           </a:p>
@@ -2116,7 +3326,7 @@
             <a:fld id="{66221E02-25CB-4963-84BC-0813985E7D90}" type="datetimeFigureOut">
               <a:rPr lang="pl-PL" smtClean="0"/>
               <a:pPr/>
-              <a:t>2013-06-10</a:t>
+              <a:t>2013-06-11</a:t>
             </a:fld>
             <a:endParaRPr lang="pl-PL"/>
           </a:p>
@@ -2258,7 +3468,7 @@
             <a:fld id="{66221E02-25CB-4963-84BC-0813985E7D90}" type="datetimeFigureOut">
               <a:rPr lang="pl-PL" smtClean="0"/>
               <a:pPr/>
-              <a:t>2013-06-10</a:t>
+              <a:t>2013-06-11</a:t>
             </a:fld>
             <a:endParaRPr lang="pl-PL"/>
           </a:p>
@@ -2537,7 +3747,7 @@
             <a:fld id="{66221E02-25CB-4963-84BC-0813985E7D90}" type="datetimeFigureOut">
               <a:rPr lang="pl-PL" smtClean="0"/>
               <a:pPr/>
-              <a:t>2013-06-10</a:t>
+              <a:t>2013-06-11</a:t>
             </a:fld>
             <a:endParaRPr lang="pl-PL"/>
           </a:p>
@@ -2946,7 +4156,7 @@
             <a:fld id="{66221E02-25CB-4963-84BC-0813985E7D90}" type="datetimeFigureOut">
               <a:rPr lang="pl-PL" smtClean="0"/>
               <a:pPr/>
-              <a:t>2013-06-10</a:t>
+              <a:t>2013-06-11</a:t>
             </a:fld>
             <a:endParaRPr lang="pl-PL"/>
           </a:p>
@@ -3286,7 +4496,7 @@
             <a:fld id="{66221E02-25CB-4963-84BC-0813985E7D90}" type="datetimeFigureOut">
               <a:rPr lang="pl-PL" smtClean="0"/>
               <a:pPr/>
-              <a:t>2013-06-10</a:t>
+              <a:t>2013-06-11</a:t>
             </a:fld>
             <a:endParaRPr lang="pl-PL"/>
           </a:p>
@@ -3935,6 +5145,172 @@
           <a:p>
             <a:r>
               <a:rPr lang="pl-PL" dirty="0" smtClean="0"/>
+              <a:t>Testy</a:t>
+            </a:r>
+            <a:endParaRPr lang="pl-PL" dirty="0"/>
+          </a:p>
+        </p:txBody>
+      </p:sp>
+      <p:graphicFrame>
+        <p:nvGraphicFramePr>
+          <p:cNvPr id="4" name="Symbol zastępczy zawartości 3"/>
+          <p:cNvGraphicFramePr>
+            <a:graphicFrameLocks noGrp="1"/>
+          </p:cNvGraphicFramePr>
+          <p:nvPr>
+            <p:ph sz="quarter" idx="1"/>
+          </p:nvPr>
+        </p:nvGraphicFramePr>
+        <p:xfrm>
+          <a:off x="457200" y="1219200"/>
+          <a:ext cx="8229600" cy="4937125"/>
+        </p:xfrm>
+        <a:graphic>
+          <a:graphicData uri="http://schemas.openxmlformats.org/drawingml/2006/chart">
+            <c:chart xmlns:c="http://schemas.openxmlformats.org/drawingml/2006/chart" xmlns:r="http://schemas.openxmlformats.org/officeDocument/2006/relationships" r:id="rId2"/>
+          </a:graphicData>
+        </a:graphic>
+      </p:graphicFrame>
+    </p:spTree>
+  </p:cSld>
+  <p:clrMapOvr>
+    <a:masterClrMapping/>
+  </p:clrMapOvr>
+</p:sld>
+</file>
+
+<file path=ppt/slides/slide11.xml><?xml version="1.0" encoding="utf-8"?>
+<p:sld xmlns:a="http://schemas.openxmlformats.org/drawingml/2006/main" xmlns:r="http://schemas.openxmlformats.org/officeDocument/2006/relationships" xmlns:p="http://schemas.openxmlformats.org/presentationml/2006/main">
+  <p:cSld>
+    <p:spTree>
+      <p:nvGrpSpPr>
+        <p:cNvPr id="1" name=""/>
+        <p:cNvGrpSpPr/>
+        <p:nvPr/>
+      </p:nvGrpSpPr>
+      <p:grpSpPr>
+        <a:xfrm>
+          <a:off x="0" y="0"/>
+          <a:ext cx="0" cy="0"/>
+          <a:chOff x="0" y="0"/>
+          <a:chExt cx="0" cy="0"/>
+        </a:xfrm>
+      </p:grpSpPr>
+      <p:sp>
+        <p:nvSpPr>
+          <p:cNvPr id="2" name="Tytuł 1"/>
+          <p:cNvSpPr>
+            <a:spLocks noGrp="1"/>
+          </p:cNvSpPr>
+          <p:nvPr>
+            <p:ph type="title"/>
+          </p:nvPr>
+        </p:nvSpPr>
+        <p:spPr/>
+        <p:txBody>
+          <a:bodyPr/>
+          <a:lstStyle/>
+          <a:p>
+            <a:r>
+              <a:rPr lang="pl-PL" dirty="0" smtClean="0"/>
+              <a:t>Podsumowanie</a:t>
+            </a:r>
+            <a:endParaRPr lang="pl-PL" dirty="0"/>
+          </a:p>
+        </p:txBody>
+      </p:sp>
+      <p:sp>
+        <p:nvSpPr>
+          <p:cNvPr id="3" name="Symbol zastępczy zawartości 2"/>
+          <p:cNvSpPr>
+            <a:spLocks noGrp="1"/>
+          </p:cNvSpPr>
+          <p:nvPr>
+            <p:ph sz="quarter" idx="1"/>
+          </p:nvPr>
+        </p:nvSpPr>
+        <p:spPr/>
+        <p:txBody>
+          <a:bodyPr/>
+          <a:lstStyle/>
+          <a:p>
+            <a:r>
+              <a:rPr lang="pl-PL" dirty="0" smtClean="0"/>
+              <a:t>Z przeprowadzonych testów wynika, że rozwiązanie </a:t>
+            </a:r>
+            <a:r>
+              <a:rPr lang="pl-PL" dirty="0" err="1" smtClean="0"/>
+              <a:t>MonogoDB</a:t>
+            </a:r>
+            <a:r>
+              <a:rPr lang="pl-PL" dirty="0" smtClean="0"/>
+              <a:t> znacząco przewyższa nasze rozwiązanie pod względem szybkości około pięcio krotnie.</a:t>
+            </a:r>
+          </a:p>
+          <a:p>
+            <a:endParaRPr lang="pl-PL" dirty="0" smtClean="0"/>
+          </a:p>
+          <a:p>
+            <a:r>
+              <a:rPr lang="pl-PL" dirty="0" smtClean="0"/>
+              <a:t>Na podstawie otrzymanych danych wynika, że nie udało poprawić nam się procesu </a:t>
+            </a:r>
+            <a:r>
+              <a:rPr lang="pl-PL" dirty="0" err="1" smtClean="0"/>
+              <a:t>shardingu</a:t>
+            </a:r>
+            <a:r>
+              <a:rPr lang="pl-PL" dirty="0" smtClean="0"/>
+              <a:t>.</a:t>
+            </a:r>
+          </a:p>
+          <a:p>
+            <a:endParaRPr lang="pl-PL" dirty="0"/>
+          </a:p>
+        </p:txBody>
+      </p:sp>
+    </p:spTree>
+  </p:cSld>
+  <p:clrMapOvr>
+    <a:masterClrMapping/>
+  </p:clrMapOvr>
+</p:sld>
+</file>
+
+<file path=ppt/slides/slide12.xml><?xml version="1.0" encoding="utf-8"?>
+<p:sld xmlns:a="http://schemas.openxmlformats.org/drawingml/2006/main" xmlns:r="http://schemas.openxmlformats.org/officeDocument/2006/relationships" xmlns:p="http://schemas.openxmlformats.org/presentationml/2006/main">
+  <p:cSld>
+    <p:spTree>
+      <p:nvGrpSpPr>
+        <p:cNvPr id="1" name=""/>
+        <p:cNvGrpSpPr/>
+        <p:nvPr/>
+      </p:nvGrpSpPr>
+      <p:grpSpPr>
+        <a:xfrm>
+          <a:off x="0" y="0"/>
+          <a:ext cx="0" cy="0"/>
+          <a:chOff x="0" y="0"/>
+          <a:chExt cx="0" cy="0"/>
+        </a:xfrm>
+      </p:grpSpPr>
+      <p:sp>
+        <p:nvSpPr>
+          <p:cNvPr id="2" name="Tytuł 1"/>
+          <p:cNvSpPr>
+            <a:spLocks noGrp="1"/>
+          </p:cNvSpPr>
+          <p:nvPr>
+            <p:ph type="title"/>
+          </p:nvPr>
+        </p:nvSpPr>
+        <p:spPr/>
+        <p:txBody>
+          <a:bodyPr/>
+          <a:lstStyle/>
+          <a:p>
+            <a:r>
+              <a:rPr lang="pl-PL" dirty="0" smtClean="0"/>
               <a:t>Autorzy</a:t>
             </a:r>
             <a:endParaRPr lang="pl-PL" dirty="0"/>
@@ -4077,11 +5453,7 @@
             </a:r>
             <a:r>
               <a:rPr lang="pl-PL" sz="2400" dirty="0" smtClean="0"/>
-              <a:t> </a:t>
-            </a:r>
-            <a:r>
-              <a:rPr lang="pl-PL" sz="2400" dirty="0" smtClean="0"/>
-              <a:t>w oparciu o rozwiązanie MongoDB. Na potrzeby projektu został stworzony serwer MongoDB o ograniczonej funkcjonalności, który umożliwia współdziałanie z klientem </a:t>
+              <a:t> w oparciu o rozwiązanie MongoDB. Na potrzeby projektu został stworzony serwer MongoDB o ograniczonej funkcjonalności, który umożliwia współdziałanie z klientem </a:t>
             </a:r>
             <a:r>
               <a:rPr lang="pl-PL" sz="2400" dirty="0" err="1" smtClean="0"/>
@@ -4368,15 +5740,7 @@
                   <a:srgbClr val="FF0000"/>
                 </a:solidFill>
               </a:rPr>
-              <a:t>CRUD</a:t>
-            </a:r>
-            <a:r>
-              <a:rPr lang="en-US" sz="2400" dirty="0" smtClean="0">
-                <a:solidFill>
-                  <a:srgbClr val="FF0000"/>
-                </a:solidFill>
-              </a:rPr>
-              <a:t> – </a:t>
+              <a:t>CRUD – </a:t>
             </a:r>
             <a:r>
               <a:rPr lang="en-US" sz="2400" b="1" dirty="0" smtClean="0">
@@ -4463,11 +5827,7 @@
             </a:r>
             <a:r>
               <a:rPr lang="pl-PL" sz="2400" dirty="0" smtClean="0"/>
-              <a:t> </a:t>
-            </a:r>
-            <a:r>
-              <a:rPr lang="pl-PL" sz="2400" dirty="0" smtClean="0"/>
-              <a:t>– główna klasa odpowiedzialna za operacje na plikach</a:t>
+              <a:t> – główna klasa odpowiedzialna za operacje na plikach</a:t>
             </a:r>
           </a:p>
           <a:p>
@@ -4485,11 +5845,7 @@
             <a:pPr lvl="0"/>
             <a:r>
               <a:rPr lang="pl-PL" sz="2400" dirty="0" smtClean="0"/>
-              <a:t>Wczytywanie </a:t>
-            </a:r>
-            <a:r>
-              <a:rPr lang="pl-PL" sz="2400" dirty="0" smtClean="0"/>
-              <a:t>bajtów z pliku reprezentujących BSON dokument.</a:t>
+              <a:t>Wczytywanie bajtów z pliku reprezentujących BSON dokument.</a:t>
             </a:r>
           </a:p>
           <a:p>
@@ -4713,15 +6069,7 @@
             </a:r>
             <a:r>
               <a:rPr lang="pl-PL" sz="2400" dirty="0" smtClean="0"/>
-              <a:t>wykonujący </a:t>
-            </a:r>
-            <a:r>
-              <a:rPr lang="pl-PL" sz="2400" dirty="0" smtClean="0"/>
-              <a:t>się w tle proces, który ma na celu utrzymanie takiej samej liczby kawałków bazy na każdym serwerze należącym do klastra </a:t>
-            </a:r>
-            <a:r>
-              <a:rPr lang="pl-PL" sz="2400" dirty="0" smtClean="0"/>
-              <a:t>shardów</a:t>
+              <a:t>wykonujący się w tle proces, który ma na celu utrzymanie takiej samej liczby kawałków bazy na każdym serwerze należącym do klastra shardów</a:t>
             </a:r>
             <a:endParaRPr lang="pl-PL" sz="2400" dirty="0" smtClean="0">
               <a:solidFill>
@@ -4734,7 +6082,6 @@
               <a:rPr lang="pl-PL" sz="2400" dirty="0" smtClean="0"/>
               <a:t>Każda instancja mongos ma uruchomionego swojego balancera</a:t>
             </a:r>
-            <a:endParaRPr lang="pl-PL" sz="2400" dirty="0" smtClean="0"/>
           </a:p>
           <a:p>
             <a:r>
@@ -4801,25 +6148,26 @@
           </a:p>
         </p:txBody>
       </p:sp>
-      <p:sp>
-        <p:nvSpPr>
-          <p:cNvPr id="3" name="Symbol zastępczy zawartości 2"/>
-          <p:cNvSpPr>
-            <a:spLocks noGrp="1"/>
-          </p:cNvSpPr>
+      <p:graphicFrame>
+        <p:nvGraphicFramePr>
+          <p:cNvPr id="4" name="Symbol zastępczy zawartości 3"/>
+          <p:cNvGraphicFramePr>
+            <a:graphicFrameLocks noGrp="1"/>
+          </p:cNvGraphicFramePr>
           <p:nvPr>
             <p:ph sz="quarter" idx="1"/>
           </p:nvPr>
-        </p:nvSpPr>
-        <p:spPr/>
-        <p:txBody>
-          <a:bodyPr/>
-          <a:lstStyle/>
-          <a:p>
-            <a:endParaRPr lang="pl-PL"/>
-          </a:p>
-        </p:txBody>
-      </p:sp>
+        </p:nvGraphicFramePr>
+        <p:xfrm>
+          <a:off x="457200" y="1219200"/>
+          <a:ext cx="8229600" cy="4937125"/>
+        </p:xfrm>
+        <a:graphic>
+          <a:graphicData uri="http://schemas.openxmlformats.org/drawingml/2006/chart">
+            <c:chart xmlns:c="http://schemas.openxmlformats.org/drawingml/2006/chart" xmlns:r="http://schemas.openxmlformats.org/officeDocument/2006/relationships" r:id="rId2"/>
+          </a:graphicData>
+        </a:graphic>
+      </p:graphicFrame>
     </p:spTree>
   </p:cSld>
   <p:clrMapOvr>
@@ -4862,31 +6210,32 @@
           <a:p>
             <a:r>
               <a:rPr lang="pl-PL" dirty="0" smtClean="0"/>
-              <a:t>Podsumowanie</a:t>
+              <a:t>Testy</a:t>
             </a:r>
             <a:endParaRPr lang="pl-PL" dirty="0"/>
           </a:p>
         </p:txBody>
       </p:sp>
-      <p:sp>
-        <p:nvSpPr>
-          <p:cNvPr id="3" name="Symbol zastępczy zawartości 2"/>
-          <p:cNvSpPr>
-            <a:spLocks noGrp="1"/>
-          </p:cNvSpPr>
+      <p:graphicFrame>
+        <p:nvGraphicFramePr>
+          <p:cNvPr id="5" name="Symbol zastępczy zawartości 4"/>
+          <p:cNvGraphicFramePr>
+            <a:graphicFrameLocks noGrp="1"/>
+          </p:cNvGraphicFramePr>
           <p:nvPr>
             <p:ph sz="quarter" idx="1"/>
           </p:nvPr>
-        </p:nvSpPr>
-        <p:spPr/>
-        <p:txBody>
-          <a:bodyPr/>
-          <a:lstStyle/>
-          <a:p>
-            <a:endParaRPr lang="pl-PL" dirty="0"/>
-          </a:p>
-        </p:txBody>
-      </p:sp>
+        </p:nvGraphicFramePr>
+        <p:xfrm>
+          <a:off x="457200" y="1219200"/>
+          <a:ext cx="8229600" cy="4937125"/>
+        </p:xfrm>
+        <a:graphic>
+          <a:graphicData uri="http://schemas.openxmlformats.org/drawingml/2006/chart">
+            <c:chart xmlns:c="http://schemas.openxmlformats.org/drawingml/2006/chart" xmlns:r="http://schemas.openxmlformats.org/officeDocument/2006/relationships" r:id="rId2"/>
+          </a:graphicData>
+        </a:graphic>
+      </p:graphicFrame>
     </p:spTree>
   </p:cSld>
   <p:clrMapOvr>

</xml_diff>